<commit_message>
Präsi/Doku aktualisiert Signed-off-by: HSklaWe <alexander.schulz10@gmx.de>
</commit_message>
<xml_diff>
--- a/Organisation/Präsentation.pptx
+++ b/Organisation/Präsentation.pptx
@@ -8,6 +8,12 @@
     <p:sldId id="256" r:id="rId2"/>
     <p:sldId id="257" r:id="rId3"/>
     <p:sldId id="258" r:id="rId4"/>
+    <p:sldId id="259" r:id="rId5"/>
+    <p:sldId id="260" r:id="rId6"/>
+    <p:sldId id="261" r:id="rId7"/>
+    <p:sldId id="262" r:id="rId8"/>
+    <p:sldId id="263" r:id="rId9"/>
+    <p:sldId id="264" r:id="rId10"/>
   </p:sldIdLst>
   <p:sldSz cx="9144000" cy="6858000" type="screen4x3"/>
   <p:notesSz cx="6858000" cy="9144000"/>
@@ -3719,7 +3725,11 @@
           <a:bodyPr/>
           <a:lstStyle/>
           <a:p>
-            <a:endParaRPr lang="de-DE"/>
+            <a:r>
+              <a:rPr lang="de-DE" dirty="0" smtClean="0"/>
+              <a:t>Schiffe Versenken</a:t>
+            </a:r>
+            <a:endParaRPr lang="de-DE" dirty="0"/>
           </a:p>
         </p:txBody>
       </p:sp>
@@ -3738,7 +3748,7 @@
           <a:bodyPr/>
           <a:lstStyle/>
           <a:p>
-            <a:endParaRPr lang="de-DE"/>
+            <a:endParaRPr lang="de-DE" dirty="0"/>
           </a:p>
         </p:txBody>
       </p:sp>
@@ -3782,7 +3792,11 @@
           <a:bodyPr/>
           <a:lstStyle/>
           <a:p>
-            <a:endParaRPr lang="de-DE"/>
+            <a:r>
+              <a:rPr lang="de-DE" dirty="0" smtClean="0"/>
+              <a:t>Agenda</a:t>
+            </a:r>
+            <a:endParaRPr lang="de-DE" dirty="0"/>
           </a:p>
         </p:txBody>
       </p:sp>
@@ -3798,10 +3812,47 @@
         </p:nvSpPr>
         <p:spPr/>
         <p:txBody>
-          <a:bodyPr/>
-          <a:lstStyle/>
-          <a:p>
-            <a:endParaRPr lang="de-DE"/>
+          <a:bodyPr>
+            <a:normAutofit/>
+          </a:bodyPr>
+          <a:lstStyle/>
+          <a:p>
+            <a:r>
+              <a:rPr lang="de-DE" dirty="0" smtClean="0"/>
+              <a:t>Zieldefinition</a:t>
+            </a:r>
+          </a:p>
+          <a:p>
+            <a:r>
+              <a:rPr lang="de-DE" dirty="0" smtClean="0"/>
+              <a:t>Architektur</a:t>
+            </a:r>
+          </a:p>
+          <a:p>
+            <a:r>
+              <a:rPr lang="de-DE" dirty="0" err="1" smtClean="0"/>
+              <a:t>Loginverfahren</a:t>
+            </a:r>
+            <a:endParaRPr lang="de-DE" dirty="0" smtClean="0"/>
+          </a:p>
+          <a:p>
+            <a:r>
+              <a:rPr lang="de-DE" dirty="0" smtClean="0"/>
+              <a:t>Codebeispiel: KI</a:t>
+            </a:r>
+          </a:p>
+          <a:p>
+            <a:r>
+              <a:rPr lang="de-DE" dirty="0" smtClean="0"/>
+              <a:t>Layout &amp; Content</a:t>
+            </a:r>
+            <a:endParaRPr lang="de-DE" dirty="0" smtClean="0"/>
+          </a:p>
+          <a:p>
+            <a:r>
+              <a:rPr lang="de-DE" dirty="0" smtClean="0"/>
+              <a:t>Live Demo</a:t>
+            </a:r>
           </a:p>
         </p:txBody>
       </p:sp>
@@ -3845,10 +3896,231 @@
           <a:bodyPr/>
           <a:lstStyle/>
           <a:p>
+            <a:r>
+              <a:rPr lang="de-DE" dirty="0" smtClean="0"/>
+              <a:t>Zieldefinition</a:t>
+            </a:r>
+            <a:endParaRPr lang="de-DE" dirty="0"/>
+          </a:p>
+        </p:txBody>
+      </p:sp>
+      <p:sp>
+        <p:nvSpPr>
+          <p:cNvPr id="3" name="Inhaltsplatzhalter 2"/>
+          <p:cNvSpPr>
+            <a:spLocks noGrp="1"/>
+          </p:cNvSpPr>
+          <p:nvPr>
+            <p:ph sz="quarter" idx="1"/>
+          </p:nvPr>
+        </p:nvSpPr>
+        <p:spPr/>
+        <p:txBody>
+          <a:bodyPr/>
+          <a:lstStyle/>
+          <a:p>
+            <a:endParaRPr lang="de-DE" dirty="0" smtClean="0"/>
+          </a:p>
+          <a:p>
+            <a:endParaRPr lang="de-DE" sz="2400" dirty="0" smtClean="0"/>
+          </a:p>
+          <a:p>
+            <a:pPr>
+              <a:buNone/>
+            </a:pPr>
+            <a:r>
+              <a:rPr lang="de-DE" sz="2400" dirty="0" smtClean="0"/>
+              <a:t>  	"</a:t>
+            </a:r>
+            <a:r>
+              <a:rPr lang="de-DE" sz="2400" dirty="0" smtClean="0"/>
+              <a:t>Es ist ein lauffähiges Schiffe versenken-Spiel mit einer </a:t>
+            </a:r>
+            <a:endParaRPr lang="de-DE" sz="2400" dirty="0" smtClean="0"/>
+          </a:p>
+          <a:p>
+            <a:pPr>
+              <a:buNone/>
+            </a:pPr>
+            <a:r>
+              <a:rPr lang="de-DE" sz="2400" dirty="0" smtClean="0"/>
+              <a:t>	</a:t>
+            </a:r>
+            <a:r>
+              <a:rPr lang="de-DE" sz="2400" dirty="0" smtClean="0"/>
+              <a:t>Mehrbenutzerfähigkeit </a:t>
+            </a:r>
+            <a:r>
+              <a:rPr lang="de-DE" sz="2400" dirty="0" smtClean="0"/>
+              <a:t>zu programmieren, welches eine </a:t>
+            </a:r>
+            <a:endParaRPr lang="de-DE" sz="2400" dirty="0" smtClean="0"/>
+          </a:p>
+          <a:p>
+            <a:pPr>
+              <a:buNone/>
+            </a:pPr>
+            <a:r>
+              <a:rPr lang="de-DE" sz="2400" dirty="0" smtClean="0"/>
+              <a:t>	Speicher- </a:t>
+            </a:r>
+            <a:r>
+              <a:rPr lang="de-DE" sz="2400" dirty="0" smtClean="0"/>
+              <a:t>und Ladenfunktion, sowie Spiel- und </a:t>
+            </a:r>
+            <a:endParaRPr lang="de-DE" sz="2400" dirty="0" smtClean="0"/>
+          </a:p>
+          <a:p>
+            <a:pPr>
+              <a:buNone/>
+            </a:pPr>
+            <a:r>
+              <a:rPr lang="de-DE" sz="2400" dirty="0" smtClean="0"/>
+              <a:t>	Spielerstatistiken </a:t>
+            </a:r>
+            <a:r>
+              <a:rPr lang="de-DE" sz="2400" dirty="0" smtClean="0"/>
+              <a:t>hat. Dies ist bis zum 12.05.2015 durch </a:t>
+            </a:r>
+            <a:endParaRPr lang="de-DE" sz="2400" dirty="0" smtClean="0"/>
+          </a:p>
+          <a:p>
+            <a:pPr>
+              <a:buNone/>
+            </a:pPr>
+            <a:r>
+              <a:rPr lang="de-DE" sz="2400" dirty="0" smtClean="0"/>
+              <a:t>	</a:t>
+            </a:r>
+            <a:r>
+              <a:rPr lang="de-DE" sz="2400" dirty="0" smtClean="0"/>
+              <a:t>das </a:t>
+            </a:r>
+            <a:r>
+              <a:rPr lang="de-DE" sz="2400" dirty="0" smtClean="0"/>
+              <a:t>Projektteam fertigzustellen."</a:t>
+            </a:r>
+          </a:p>
+          <a:p>
+            <a:endParaRPr lang="de-DE" dirty="0"/>
+          </a:p>
+        </p:txBody>
+      </p:sp>
+    </p:spTree>
+  </p:cSld>
+  <p:clrMapOvr>
+    <a:masterClrMapping/>
+  </p:clrMapOvr>
+</p:sld>
+</file>
+
+<file path=ppt/slides/slide4.xml><?xml version="1.0" encoding="utf-8"?>
+<p:sld xmlns:a="http://schemas.openxmlformats.org/drawingml/2006/main" xmlns:r="http://schemas.openxmlformats.org/officeDocument/2006/relationships" xmlns:p="http://schemas.openxmlformats.org/presentationml/2006/main">
+  <p:cSld>
+    <p:spTree>
+      <p:nvGrpSpPr>
+        <p:cNvPr id="1" name=""/>
+        <p:cNvGrpSpPr/>
+        <p:nvPr/>
+      </p:nvGrpSpPr>
+      <p:grpSpPr>
+        <a:xfrm>
+          <a:off x="0" y="0"/>
+          <a:ext cx="0" cy="0"/>
+          <a:chOff x="0" y="0"/>
+          <a:chExt cx="0" cy="0"/>
+        </a:xfrm>
+      </p:grpSpPr>
+      <p:sp>
+        <p:nvSpPr>
+          <p:cNvPr id="2" name="Titel 1"/>
+          <p:cNvSpPr>
+            <a:spLocks noGrp="1"/>
+          </p:cNvSpPr>
+          <p:nvPr>
+            <p:ph type="title"/>
+          </p:nvPr>
+        </p:nvSpPr>
+        <p:spPr/>
+        <p:txBody>
+          <a:bodyPr/>
+          <a:lstStyle/>
+          <a:p>
+            <a:r>
+              <a:rPr lang="de-DE" dirty="0" smtClean="0"/>
+              <a:t>Architektur</a:t>
+            </a:r>
+            <a:endParaRPr lang="de-DE" dirty="0"/>
+          </a:p>
+        </p:txBody>
+      </p:sp>
+      <p:sp>
+        <p:nvSpPr>
+          <p:cNvPr id="3" name="Inhaltsplatzhalter 2"/>
+          <p:cNvSpPr>
+            <a:spLocks noGrp="1"/>
+          </p:cNvSpPr>
+          <p:nvPr>
+            <p:ph sz="quarter" idx="1"/>
+          </p:nvPr>
+        </p:nvSpPr>
+        <p:spPr/>
+        <p:txBody>
+          <a:bodyPr/>
+          <a:lstStyle/>
+          <a:p>
             <a:endParaRPr lang="de-DE"/>
           </a:p>
         </p:txBody>
       </p:sp>
+    </p:spTree>
+  </p:cSld>
+  <p:clrMapOvr>
+    <a:masterClrMapping/>
+  </p:clrMapOvr>
+</p:sld>
+</file>
+
+<file path=ppt/slides/slide5.xml><?xml version="1.0" encoding="utf-8"?>
+<p:sld xmlns:a="http://schemas.openxmlformats.org/drawingml/2006/main" xmlns:r="http://schemas.openxmlformats.org/officeDocument/2006/relationships" xmlns:p="http://schemas.openxmlformats.org/presentationml/2006/main">
+  <p:cSld>
+    <p:spTree>
+      <p:nvGrpSpPr>
+        <p:cNvPr id="1" name=""/>
+        <p:cNvGrpSpPr/>
+        <p:nvPr/>
+      </p:nvGrpSpPr>
+      <p:grpSpPr>
+        <a:xfrm>
+          <a:off x="0" y="0"/>
+          <a:ext cx="0" cy="0"/>
+          <a:chOff x="0" y="0"/>
+          <a:chExt cx="0" cy="0"/>
+        </a:xfrm>
+      </p:grpSpPr>
+      <p:sp>
+        <p:nvSpPr>
+          <p:cNvPr id="2" name="Titel 1"/>
+          <p:cNvSpPr>
+            <a:spLocks noGrp="1"/>
+          </p:cNvSpPr>
+          <p:nvPr>
+            <p:ph type="title"/>
+          </p:nvPr>
+        </p:nvSpPr>
+        <p:spPr/>
+        <p:txBody>
+          <a:bodyPr/>
+          <a:lstStyle/>
+          <a:p>
+            <a:r>
+              <a:rPr lang="de-DE" dirty="0" err="1" smtClean="0"/>
+              <a:t>Loginverfahren</a:t>
+            </a:r>
+            <a:endParaRPr lang="de-DE" dirty="0"/>
+          </a:p>
+        </p:txBody>
+      </p:sp>
       <p:sp>
         <p:nvSpPr>
           <p:cNvPr id="3" name="Inhaltsplatzhalter 2"/>
@@ -3865,6 +4137,327 @@
           <a:lstStyle/>
           <a:p>
             <a:endParaRPr lang="de-DE"/>
+          </a:p>
+        </p:txBody>
+      </p:sp>
+    </p:spTree>
+  </p:cSld>
+  <p:clrMapOvr>
+    <a:masterClrMapping/>
+  </p:clrMapOvr>
+</p:sld>
+</file>
+
+<file path=ppt/slides/slide6.xml><?xml version="1.0" encoding="utf-8"?>
+<p:sld xmlns:a="http://schemas.openxmlformats.org/drawingml/2006/main" xmlns:r="http://schemas.openxmlformats.org/officeDocument/2006/relationships" xmlns:p="http://schemas.openxmlformats.org/presentationml/2006/main">
+  <p:cSld>
+    <p:spTree>
+      <p:nvGrpSpPr>
+        <p:cNvPr id="1" name=""/>
+        <p:cNvGrpSpPr/>
+        <p:nvPr/>
+      </p:nvGrpSpPr>
+      <p:grpSpPr>
+        <a:xfrm>
+          <a:off x="0" y="0"/>
+          <a:ext cx="0" cy="0"/>
+          <a:chOff x="0" y="0"/>
+          <a:chExt cx="0" cy="0"/>
+        </a:xfrm>
+      </p:grpSpPr>
+      <p:sp>
+        <p:nvSpPr>
+          <p:cNvPr id="2" name="Titel 1"/>
+          <p:cNvSpPr>
+            <a:spLocks noGrp="1"/>
+          </p:cNvSpPr>
+          <p:nvPr>
+            <p:ph type="title"/>
+          </p:nvPr>
+        </p:nvSpPr>
+        <p:spPr/>
+        <p:txBody>
+          <a:bodyPr/>
+          <a:lstStyle/>
+          <a:p>
+            <a:r>
+              <a:rPr lang="de-DE" dirty="0" smtClean="0"/>
+              <a:t>Codebeispiel: KI</a:t>
+            </a:r>
+            <a:endParaRPr lang="de-DE" dirty="0"/>
+          </a:p>
+        </p:txBody>
+      </p:sp>
+      <p:sp>
+        <p:nvSpPr>
+          <p:cNvPr id="3" name="Inhaltsplatzhalter 2"/>
+          <p:cNvSpPr>
+            <a:spLocks noGrp="1"/>
+          </p:cNvSpPr>
+          <p:nvPr>
+            <p:ph sz="quarter" idx="1"/>
+          </p:nvPr>
+        </p:nvSpPr>
+        <p:spPr/>
+        <p:txBody>
+          <a:bodyPr/>
+          <a:lstStyle/>
+          <a:p>
+            <a:endParaRPr lang="de-DE"/>
+          </a:p>
+        </p:txBody>
+      </p:sp>
+    </p:spTree>
+  </p:cSld>
+  <p:clrMapOvr>
+    <a:masterClrMapping/>
+  </p:clrMapOvr>
+</p:sld>
+</file>
+
+<file path=ppt/slides/slide7.xml><?xml version="1.0" encoding="utf-8"?>
+<p:sld xmlns:a="http://schemas.openxmlformats.org/drawingml/2006/main" xmlns:r="http://schemas.openxmlformats.org/officeDocument/2006/relationships" xmlns:p="http://schemas.openxmlformats.org/presentationml/2006/main">
+  <p:cSld>
+    <p:spTree>
+      <p:nvGrpSpPr>
+        <p:cNvPr id="1" name=""/>
+        <p:cNvGrpSpPr/>
+        <p:nvPr/>
+      </p:nvGrpSpPr>
+      <p:grpSpPr>
+        <a:xfrm>
+          <a:off x="0" y="0"/>
+          <a:ext cx="0" cy="0"/>
+          <a:chOff x="0" y="0"/>
+          <a:chExt cx="0" cy="0"/>
+        </a:xfrm>
+      </p:grpSpPr>
+      <p:sp>
+        <p:nvSpPr>
+          <p:cNvPr id="2" name="Titel 1"/>
+          <p:cNvSpPr>
+            <a:spLocks noGrp="1"/>
+          </p:cNvSpPr>
+          <p:nvPr>
+            <p:ph type="title"/>
+          </p:nvPr>
+        </p:nvSpPr>
+        <p:spPr/>
+        <p:txBody>
+          <a:bodyPr/>
+          <a:lstStyle/>
+          <a:p>
+            <a:r>
+              <a:rPr lang="de-DE" dirty="0" smtClean="0"/>
+              <a:t>Layout &amp; Content</a:t>
+            </a:r>
+            <a:endParaRPr lang="de-DE" dirty="0"/>
+          </a:p>
+        </p:txBody>
+      </p:sp>
+      <p:sp>
+        <p:nvSpPr>
+          <p:cNvPr id="3" name="Inhaltsplatzhalter 2"/>
+          <p:cNvSpPr>
+            <a:spLocks noGrp="1"/>
+          </p:cNvSpPr>
+          <p:nvPr>
+            <p:ph sz="quarter" idx="1"/>
+          </p:nvPr>
+        </p:nvSpPr>
+        <p:spPr/>
+        <p:txBody>
+          <a:bodyPr/>
+          <a:lstStyle/>
+          <a:p>
+            <a:endParaRPr lang="de-DE"/>
+          </a:p>
+        </p:txBody>
+      </p:sp>
+    </p:spTree>
+  </p:cSld>
+  <p:clrMapOvr>
+    <a:masterClrMapping/>
+  </p:clrMapOvr>
+</p:sld>
+</file>
+
+<file path=ppt/slides/slide8.xml><?xml version="1.0" encoding="utf-8"?>
+<p:sld xmlns:a="http://schemas.openxmlformats.org/drawingml/2006/main" xmlns:r="http://schemas.openxmlformats.org/officeDocument/2006/relationships" xmlns:p="http://schemas.openxmlformats.org/presentationml/2006/main">
+  <p:cSld>
+    <p:spTree>
+      <p:nvGrpSpPr>
+        <p:cNvPr id="1" name=""/>
+        <p:cNvGrpSpPr/>
+        <p:nvPr/>
+      </p:nvGrpSpPr>
+      <p:grpSpPr>
+        <a:xfrm>
+          <a:off x="0" y="0"/>
+          <a:ext cx="0" cy="0"/>
+          <a:chOff x="0" y="0"/>
+          <a:chExt cx="0" cy="0"/>
+        </a:xfrm>
+      </p:grpSpPr>
+      <p:sp>
+        <p:nvSpPr>
+          <p:cNvPr id="2" name="Titel 1"/>
+          <p:cNvSpPr>
+            <a:spLocks noGrp="1"/>
+          </p:cNvSpPr>
+          <p:nvPr>
+            <p:ph type="title"/>
+          </p:nvPr>
+        </p:nvSpPr>
+        <p:spPr/>
+        <p:txBody>
+          <a:bodyPr/>
+          <a:lstStyle/>
+          <a:p>
+            <a:r>
+              <a:rPr lang="de-DE" dirty="0" smtClean="0"/>
+              <a:t>Live Demo</a:t>
+            </a:r>
+            <a:endParaRPr lang="de-DE" dirty="0"/>
+          </a:p>
+        </p:txBody>
+      </p:sp>
+      <p:pic>
+        <p:nvPicPr>
+          <p:cNvPr id="2050" name="Picture 2" descr="https://www.ap4projectmanagers.com/ap4/sources/images/live_demo_ilust.jpg"/>
+          <p:cNvPicPr>
+            <a:picLocks noChangeAspect="1" noChangeArrowheads="1"/>
+          </p:cNvPicPr>
+          <p:nvPr/>
+        </p:nvPicPr>
+        <p:blipFill>
+          <a:blip r:embed="rId2" cstate="print"/>
+          <a:srcRect/>
+          <a:stretch>
+            <a:fillRect/>
+          </a:stretch>
+        </p:blipFill>
+        <p:spPr bwMode="auto">
+          <a:xfrm>
+            <a:off x="1043608" y="2276872"/>
+            <a:ext cx="7341656" cy="3384376"/>
+          </a:xfrm>
+          <a:prstGeom prst="rect">
+            <a:avLst/>
+          </a:prstGeom>
+          <a:noFill/>
+        </p:spPr>
+      </p:pic>
+    </p:spTree>
+  </p:cSld>
+  <p:clrMapOvr>
+    <a:masterClrMapping/>
+  </p:clrMapOvr>
+</p:sld>
+</file>
+
+<file path=ppt/slides/slide9.xml><?xml version="1.0" encoding="utf-8"?>
+<p:sld xmlns:a="http://schemas.openxmlformats.org/drawingml/2006/main" xmlns:r="http://schemas.openxmlformats.org/officeDocument/2006/relationships" xmlns:p="http://schemas.openxmlformats.org/presentationml/2006/main">
+  <p:cSld>
+    <p:spTree>
+      <p:nvGrpSpPr>
+        <p:cNvPr id="1" name=""/>
+        <p:cNvGrpSpPr/>
+        <p:nvPr/>
+      </p:nvGrpSpPr>
+      <p:grpSpPr>
+        <a:xfrm>
+          <a:off x="0" y="0"/>
+          <a:ext cx="0" cy="0"/>
+          <a:chOff x="0" y="0"/>
+          <a:chExt cx="0" cy="0"/>
+        </a:xfrm>
+      </p:grpSpPr>
+      <p:pic>
+        <p:nvPicPr>
+          <p:cNvPr id="1025" name="Picture 1" descr="C:\Users\CavemaN\AppData\Local\Microsoft\Windows\INetCache\IE\Y18EMCFI\large-comic-eyes-and-feet-asking-question-33.3-13982[1].gif"/>
+          <p:cNvPicPr>
+            <a:picLocks noChangeAspect="1" noChangeArrowheads="1"/>
+          </p:cNvPicPr>
+          <p:nvPr/>
+        </p:nvPicPr>
+        <p:blipFill>
+          <a:blip r:embed="rId2" cstate="print"/>
+          <a:srcRect/>
+          <a:stretch>
+            <a:fillRect/>
+          </a:stretch>
+        </p:blipFill>
+        <p:spPr bwMode="auto">
+          <a:xfrm>
+            <a:off x="2339752" y="2060848"/>
+            <a:ext cx="5544616" cy="4030230"/>
+          </a:xfrm>
+          <a:prstGeom prst="rect">
+            <a:avLst/>
+          </a:prstGeom>
+          <a:noFill/>
+        </p:spPr>
+      </p:pic>
+      <p:sp>
+        <p:nvSpPr>
+          <p:cNvPr id="2" name="Titel 1"/>
+          <p:cNvSpPr>
+            <a:spLocks noGrp="1"/>
+          </p:cNvSpPr>
+          <p:nvPr>
+            <p:ph type="title"/>
+          </p:nvPr>
+        </p:nvSpPr>
+        <p:spPr/>
+        <p:txBody>
+          <a:bodyPr>
+            <a:normAutofit fontScale="90000"/>
+          </a:bodyPr>
+          <a:lstStyle/>
+          <a:p>
+            <a:r>
+              <a:rPr lang="de-DE" dirty="0" smtClean="0"/>
+              <a:t>Wir stehen Ihnen gerne zur Verfügung</a:t>
+            </a:r>
+            <a:endParaRPr lang="de-DE" dirty="0"/>
+          </a:p>
+        </p:txBody>
+      </p:sp>
+      <p:sp>
+        <p:nvSpPr>
+          <p:cNvPr id="3" name="Inhaltsplatzhalter 2"/>
+          <p:cNvSpPr>
+            <a:spLocks noGrp="1"/>
+          </p:cNvSpPr>
+          <p:nvPr>
+            <p:ph sz="quarter" idx="1"/>
+          </p:nvPr>
+        </p:nvSpPr>
+        <p:spPr/>
+        <p:txBody>
+          <a:bodyPr/>
+          <a:lstStyle/>
+          <a:p>
+            <a:endParaRPr lang="de-DE" dirty="0" smtClean="0"/>
+          </a:p>
+          <a:p>
+            <a:endParaRPr lang="de-DE" dirty="0" smtClean="0"/>
+          </a:p>
+          <a:p>
+            <a:pPr>
+              <a:buNone/>
+            </a:pPr>
+            <a:endParaRPr lang="de-DE" dirty="0" smtClean="0"/>
+          </a:p>
+          <a:p>
+            <a:pPr algn="ctr">
+              <a:buNone/>
+            </a:pPr>
+            <a:r>
+              <a:rPr lang="de-DE" sz="3600" b="1" dirty="0" smtClean="0"/>
+              <a:t>Noch Fragen?</a:t>
+            </a:r>
           </a:p>
         </p:txBody>
       </p:sp>

</xml_diff>

<commit_message>
Präsi aktuelle Signed-off-by: HSklaWe <alexander.schulz10@gmx.de>
</commit_message>
<xml_diff>
--- a/Organisation/Präsentation.pptx
+++ b/Organisation/Präsentation.pptx
@@ -3830,8 +3830,8 @@
           </a:p>
           <a:p>
             <a:r>
-              <a:rPr lang="de-DE" dirty="0" err="1" smtClean="0"/>
-              <a:t>Loginverfahren</a:t>
+              <a:rPr lang="de-DE" dirty="0" smtClean="0"/>
+              <a:t>Sicherheit</a:t>
             </a:r>
             <a:endParaRPr lang="de-DE" dirty="0" smtClean="0"/>
           </a:p>
@@ -3846,7 +3846,6 @@
               <a:rPr lang="de-DE" dirty="0" smtClean="0"/>
               <a:t>Layout &amp; Content</a:t>
             </a:r>
-            <a:endParaRPr lang="de-DE" dirty="0" smtClean="0"/>
           </a:p>
           <a:p>
             <a:r>
@@ -3930,13 +3929,8 @@
             </a:pPr>
             <a:r>
               <a:rPr lang="de-DE" sz="2400" dirty="0" smtClean="0"/>
-              <a:t>  	"</a:t>
-            </a:r>
-            <a:r>
-              <a:rPr lang="de-DE" sz="2400" dirty="0" smtClean="0"/>
-              <a:t>Es ist ein lauffähiges Schiffe versenken-Spiel mit einer </a:t>
-            </a:r>
-            <a:endParaRPr lang="de-DE" sz="2400" dirty="0" smtClean="0"/>
+              <a:t>  	"Es ist ein lauffähiges Schiffe versenken-Spiel mit einer </a:t>
+            </a:r>
           </a:p>
           <a:p>
             <a:pPr>
@@ -3944,17 +3938,8 @@
             </a:pPr>
             <a:r>
               <a:rPr lang="de-DE" sz="2400" dirty="0" smtClean="0"/>
-              <a:t>	</a:t>
-            </a:r>
-            <a:r>
-              <a:rPr lang="de-DE" sz="2400" dirty="0" smtClean="0"/>
-              <a:t>Mehrbenutzerfähigkeit </a:t>
-            </a:r>
-            <a:r>
-              <a:rPr lang="de-DE" sz="2400" dirty="0" smtClean="0"/>
-              <a:t>zu programmieren, welches eine </a:t>
-            </a:r>
-            <a:endParaRPr lang="de-DE" sz="2400" dirty="0" smtClean="0"/>
+              <a:t>	Mehrbenutzerfähigkeit zu programmieren, welches eine </a:t>
+            </a:r>
           </a:p>
           <a:p>
             <a:pPr>
@@ -3962,13 +3947,8 @@
             </a:pPr>
             <a:r>
               <a:rPr lang="de-DE" sz="2400" dirty="0" smtClean="0"/>
-              <a:t>	Speicher- </a:t>
-            </a:r>
-            <a:r>
-              <a:rPr lang="de-DE" sz="2400" dirty="0" smtClean="0"/>
-              <a:t>und Ladenfunktion, sowie Spiel- und </a:t>
-            </a:r>
-            <a:endParaRPr lang="de-DE" sz="2400" dirty="0" smtClean="0"/>
+              <a:t>	Speicher- und Ladenfunktion, sowie Spiel- und </a:t>
+            </a:r>
           </a:p>
           <a:p>
             <a:pPr>
@@ -3976,13 +3956,8 @@
             </a:pPr>
             <a:r>
               <a:rPr lang="de-DE" sz="2400" dirty="0" smtClean="0"/>
-              <a:t>	Spielerstatistiken </a:t>
-            </a:r>
-            <a:r>
-              <a:rPr lang="de-DE" sz="2400" dirty="0" smtClean="0"/>
-              <a:t>hat. Dies ist bis zum 12.05.2015 durch </a:t>
-            </a:r>
-            <a:endParaRPr lang="de-DE" sz="2400" dirty="0" smtClean="0"/>
+              <a:t>	Spielerstatistiken hat. Dies ist bis zum 12.05.2015 durch </a:t>
+            </a:r>
           </a:p>
           <a:p>
             <a:pPr>
@@ -3990,15 +3965,7 @@
             </a:pPr>
             <a:r>
               <a:rPr lang="de-DE" sz="2400" dirty="0" smtClean="0"/>
-              <a:t>	</a:t>
-            </a:r>
-            <a:r>
-              <a:rPr lang="de-DE" sz="2400" dirty="0" smtClean="0"/>
-              <a:t>das </a:t>
-            </a:r>
-            <a:r>
-              <a:rPr lang="de-DE" sz="2400" dirty="0" smtClean="0"/>
-              <a:t>Projektteam fertigzustellen."</a:t>
+              <a:t>	das Projektteam fertigzustellen."</a:t>
             </a:r>
           </a:p>
           <a:p>
@@ -4114,32 +4081,93 @@
           <a:lstStyle/>
           <a:p>
             <a:r>
+              <a:rPr lang="de-DE" dirty="0" smtClean="0"/>
+              <a:t>Sicherheit</a:t>
+            </a:r>
+            <a:endParaRPr lang="de-DE" dirty="0"/>
+          </a:p>
+        </p:txBody>
+      </p:sp>
+      <p:sp>
+        <p:nvSpPr>
+          <p:cNvPr id="3" name="Inhaltsplatzhalter 2"/>
+          <p:cNvSpPr>
+            <a:spLocks noGrp="1"/>
+          </p:cNvSpPr>
+          <p:nvPr>
+            <p:ph sz="quarter" idx="1"/>
+          </p:nvPr>
+        </p:nvSpPr>
+        <p:spPr/>
+        <p:txBody>
+          <a:bodyPr/>
+          <a:lstStyle/>
+          <a:p>
+            <a:endParaRPr lang="de-DE" dirty="0" smtClean="0"/>
+          </a:p>
+          <a:p>
+            <a:r>
+              <a:rPr lang="de-DE" dirty="0" smtClean="0"/>
+              <a:t>Prüfung regulärer Ausdrücke gegen SQL-</a:t>
+            </a:r>
+            <a:r>
               <a:rPr lang="de-DE" dirty="0" err="1" smtClean="0"/>
-              <a:t>Loginverfahren</a:t>
+              <a:t>Injections</a:t>
+            </a:r>
+            <a:endParaRPr lang="de-DE" dirty="0" smtClean="0"/>
+          </a:p>
+          <a:p>
+            <a:endParaRPr lang="de-DE" dirty="0" smtClean="0"/>
+          </a:p>
+          <a:p>
+            <a:r>
+              <a:rPr lang="de-DE" dirty="0" smtClean="0"/>
+              <a:t>Session </a:t>
+            </a:r>
+            <a:r>
+              <a:rPr lang="de-DE" dirty="0" err="1" smtClean="0"/>
+              <a:t>Hijacking</a:t>
+            </a:r>
+            <a:endParaRPr lang="de-DE" dirty="0" smtClean="0"/>
+          </a:p>
+          <a:p>
+            <a:endParaRPr lang="de-DE" dirty="0" smtClean="0"/>
+          </a:p>
+          <a:p>
+            <a:r>
+              <a:rPr lang="de-DE" dirty="0" smtClean="0"/>
+              <a:t>Passwortverschlüsselung: SHA2-256</a:t>
             </a:r>
             <a:endParaRPr lang="de-DE" dirty="0"/>
           </a:p>
         </p:txBody>
       </p:sp>
-      <p:sp>
-        <p:nvSpPr>
-          <p:cNvPr id="3" name="Inhaltsplatzhalter 2"/>
-          <p:cNvSpPr>
-            <a:spLocks noGrp="1"/>
-          </p:cNvSpPr>
-          <p:nvPr>
-            <p:ph sz="quarter" idx="1"/>
-          </p:nvPr>
-        </p:nvSpPr>
-        <p:spPr/>
-        <p:txBody>
-          <a:bodyPr/>
-          <a:lstStyle/>
-          <a:p>
-            <a:endParaRPr lang="de-DE"/>
-          </a:p>
-        </p:txBody>
-      </p:sp>
+      <p:pic>
+        <p:nvPicPr>
+          <p:cNvPr id="1026" name="Picture 2" descr="C:\Users\CavemaN\AppData\Local\Microsoft\Windows\INetCache\IE\8183GQT6\padlock-26ia32s[1].jpg"/>
+          <p:cNvPicPr>
+            <a:picLocks noChangeAspect="1" noChangeArrowheads="1"/>
+          </p:cNvPicPr>
+          <p:nvPr/>
+        </p:nvPicPr>
+        <p:blipFill>
+          <a:blip r:embed="rId2" cstate="print"/>
+          <a:srcRect/>
+          <a:stretch>
+            <a:fillRect/>
+          </a:stretch>
+        </p:blipFill>
+        <p:spPr bwMode="auto">
+          <a:xfrm>
+            <a:off x="6516216" y="4293096"/>
+            <a:ext cx="2288340" cy="2280712"/>
+          </a:xfrm>
+          <a:prstGeom prst="rect">
+            <a:avLst/>
+          </a:prstGeom>
+          <a:noFill/>
+        </p:spPr>
+      </p:pic>
     </p:spTree>
   </p:cSld>
   <p:clrMapOvr>

</xml_diff>

<commit_message>
Doku fast fertig Signed-off-by: HSklaWe <alexander.schulz10@gmx.de>
</commit_message>
<xml_diff>
--- a/Organisation/Präsentation.pptx
+++ b/Organisation/Präsentation.pptx
@@ -407,7 +407,7 @@
             <a:fld id="{1BA50D42-C9CD-4801-B293-61D1F53EC57E}" type="datetimeFigureOut">
               <a:rPr lang="de-DE" smtClean="0"/>
               <a:pPr/>
-              <a:t>28.04.2015</a:t>
+              <a:t>18.05.2015</a:t>
             </a:fld>
             <a:endParaRPr lang="de-DE"/>
           </a:p>
@@ -600,7 +600,7 @@
             <a:fld id="{1BA50D42-C9CD-4801-B293-61D1F53EC57E}" type="datetimeFigureOut">
               <a:rPr lang="de-DE" smtClean="0"/>
               <a:pPr/>
-              <a:t>28.04.2015</a:t>
+              <a:t>18.05.2015</a:t>
             </a:fld>
             <a:endParaRPr lang="de-DE"/>
           </a:p>
@@ -787,7 +787,7 @@
             <a:fld id="{1BA50D42-C9CD-4801-B293-61D1F53EC57E}" type="datetimeFigureOut">
               <a:rPr lang="de-DE" smtClean="0"/>
               <a:pPr/>
-              <a:t>28.04.2015</a:t>
+              <a:t>18.05.2015</a:t>
             </a:fld>
             <a:endParaRPr lang="de-DE"/>
           </a:p>
@@ -1052,7 +1052,7 @@
             <a:fld id="{1BA50D42-C9CD-4801-B293-61D1F53EC57E}" type="datetimeFigureOut">
               <a:rPr lang="de-DE" smtClean="0"/>
               <a:pPr/>
-              <a:t>28.04.2015</a:t>
+              <a:t>18.05.2015</a:t>
             </a:fld>
             <a:endParaRPr lang="de-DE"/>
           </a:p>
@@ -1470,7 +1470,7 @@
             <a:fld id="{1BA50D42-C9CD-4801-B293-61D1F53EC57E}" type="datetimeFigureOut">
               <a:rPr lang="de-DE" smtClean="0"/>
               <a:pPr/>
-              <a:t>28.04.2015</a:t>
+              <a:t>18.05.2015</a:t>
             </a:fld>
             <a:endParaRPr lang="de-DE"/>
           </a:p>
@@ -1714,7 +1714,7 @@
             <a:fld id="{1BA50D42-C9CD-4801-B293-61D1F53EC57E}" type="datetimeFigureOut">
               <a:rPr lang="de-DE" smtClean="0"/>
               <a:pPr/>
-              <a:t>28.04.2015</a:t>
+              <a:t>18.05.2015</a:t>
             </a:fld>
             <a:endParaRPr lang="de-DE"/>
           </a:p>
@@ -1952,7 +1952,7 @@
             <a:fld id="{1BA50D42-C9CD-4801-B293-61D1F53EC57E}" type="datetimeFigureOut">
               <a:rPr lang="de-DE" smtClean="0"/>
               <a:pPr/>
-              <a:t>28.04.2015</a:t>
+              <a:t>18.05.2015</a:t>
             </a:fld>
             <a:endParaRPr lang="de-DE"/>
           </a:p>
@@ -2149,7 +2149,7 @@
             <a:fld id="{1BA50D42-C9CD-4801-B293-61D1F53EC57E}" type="datetimeFigureOut">
               <a:rPr lang="de-DE" smtClean="0"/>
               <a:pPr/>
-              <a:t>28.04.2015</a:t>
+              <a:t>18.05.2015</a:t>
             </a:fld>
             <a:endParaRPr lang="de-DE"/>
           </a:p>
@@ -2249,7 +2249,7 @@
             <a:fld id="{1BA50D42-C9CD-4801-B293-61D1F53EC57E}" type="datetimeFigureOut">
               <a:rPr lang="de-DE" smtClean="0"/>
               <a:pPr/>
-              <a:t>28.04.2015</a:t>
+              <a:t>18.05.2015</a:t>
             </a:fld>
             <a:endParaRPr lang="de-DE"/>
           </a:p>
@@ -2387,7 +2387,7 @@
             <a:fld id="{1BA50D42-C9CD-4801-B293-61D1F53EC57E}" type="datetimeFigureOut">
               <a:rPr lang="de-DE" smtClean="0"/>
               <a:pPr/>
-              <a:t>28.04.2015</a:t>
+              <a:t>18.05.2015</a:t>
             </a:fld>
             <a:endParaRPr lang="de-DE"/>
           </a:p>
@@ -2907,7 +2907,7 @@
             <a:fld id="{1BA50D42-C9CD-4801-B293-61D1F53EC57E}" type="datetimeFigureOut">
               <a:rPr lang="de-DE" smtClean="0"/>
               <a:pPr/>
-              <a:t>28.04.2015</a:t>
+              <a:t>18.05.2015</a:t>
             </a:fld>
             <a:endParaRPr lang="de-DE"/>
           </a:p>
@@ -3170,7 +3170,7 @@
             <a:fld id="{1BA50D42-C9CD-4801-B293-61D1F53EC57E}" type="datetimeFigureOut">
               <a:rPr lang="de-DE" smtClean="0"/>
               <a:pPr/>
-              <a:t>28.04.2015</a:t>
+              <a:t>18.05.2015</a:t>
             </a:fld>
             <a:endParaRPr lang="de-DE"/>
           </a:p>
@@ -3833,7 +3833,6 @@
               <a:rPr lang="de-DE" dirty="0" smtClean="0"/>
               <a:t>Sicherheit</a:t>
             </a:r>
-            <a:endParaRPr lang="de-DE" dirty="0" smtClean="0"/>
           </a:p>
           <a:p>
             <a:r>
@@ -4127,6 +4126,10 @@
             <a:r>
               <a:rPr lang="de-DE" dirty="0" err="1" smtClean="0"/>
               <a:t>Hijacking</a:t>
+            </a:r>
+            <a:r>
+              <a:rPr lang="de-DE" dirty="0" smtClean="0"/>
+              <a:t> &amp; Session Fixation</a:t>
             </a:r>
             <a:endParaRPr lang="de-DE" dirty="0" smtClean="0"/>
           </a:p>

</xml_diff>